<commit_message>
Update ABP Community Talks 2022.5 Intro.pptx
</commit_message>
<xml_diff>
--- a/2022-06-09 ABP Community Talks 2022.5/ABP Community Talks 2022.5 Intro.pptx
+++ b/2022-06-09 ABP Community Talks 2022.5/ABP Community Talks 2022.5 Intro.pptx
@@ -267,7 +267,7 @@
           <a:p>
             <a:fld id="{2A14C9FE-EBC3-45D3-899C-58AAF4F8AF71}" type="datetimeFigureOut">
               <a:rPr lang="en-US" smtClean="0"/>
-              <a:t>02-Jun-22</a:t>
+              <a:t>09-Jun-22</a:t>
             </a:fld>
             <a:endParaRPr lang="en-US"/>
           </a:p>
@@ -465,7 +465,7 @@
           <a:p>
             <a:fld id="{2A14C9FE-EBC3-45D3-899C-58AAF4F8AF71}" type="datetimeFigureOut">
               <a:rPr lang="en-US" smtClean="0"/>
-              <a:t>02-Jun-22</a:t>
+              <a:t>09-Jun-22</a:t>
             </a:fld>
             <a:endParaRPr lang="en-US"/>
           </a:p>
@@ -673,7 +673,7 @@
           <a:p>
             <a:fld id="{2A14C9FE-EBC3-45D3-899C-58AAF4F8AF71}" type="datetimeFigureOut">
               <a:rPr lang="en-US" smtClean="0"/>
-              <a:t>02-Jun-22</a:t>
+              <a:t>09-Jun-22</a:t>
             </a:fld>
             <a:endParaRPr lang="en-US"/>
           </a:p>
@@ -871,7 +871,7 @@
           <a:p>
             <a:fld id="{2A14C9FE-EBC3-45D3-899C-58AAF4F8AF71}" type="datetimeFigureOut">
               <a:rPr lang="en-US" smtClean="0"/>
-              <a:t>02-Jun-22</a:t>
+              <a:t>09-Jun-22</a:t>
             </a:fld>
             <a:endParaRPr lang="en-US"/>
           </a:p>
@@ -1146,7 +1146,7 @@
           <a:p>
             <a:fld id="{2A14C9FE-EBC3-45D3-899C-58AAF4F8AF71}" type="datetimeFigureOut">
               <a:rPr lang="en-US" smtClean="0"/>
-              <a:t>02-Jun-22</a:t>
+              <a:t>09-Jun-22</a:t>
             </a:fld>
             <a:endParaRPr lang="en-US"/>
           </a:p>
@@ -1411,7 +1411,7 @@
           <a:p>
             <a:fld id="{2A14C9FE-EBC3-45D3-899C-58AAF4F8AF71}" type="datetimeFigureOut">
               <a:rPr lang="en-US" smtClean="0"/>
-              <a:t>02-Jun-22</a:t>
+              <a:t>09-Jun-22</a:t>
             </a:fld>
             <a:endParaRPr lang="en-US"/>
           </a:p>
@@ -1823,7 +1823,7 @@
           <a:p>
             <a:fld id="{2A14C9FE-EBC3-45D3-899C-58AAF4F8AF71}" type="datetimeFigureOut">
               <a:rPr lang="en-US" smtClean="0"/>
-              <a:t>02-Jun-22</a:t>
+              <a:t>09-Jun-22</a:t>
             </a:fld>
             <a:endParaRPr lang="en-US"/>
           </a:p>
@@ -1964,7 +1964,7 @@
           <a:p>
             <a:fld id="{2A14C9FE-EBC3-45D3-899C-58AAF4F8AF71}" type="datetimeFigureOut">
               <a:rPr lang="en-US" smtClean="0"/>
-              <a:t>02-Jun-22</a:t>
+              <a:t>09-Jun-22</a:t>
             </a:fld>
             <a:endParaRPr lang="en-US"/>
           </a:p>
@@ -2077,7 +2077,7 @@
           <a:p>
             <a:fld id="{2A14C9FE-EBC3-45D3-899C-58AAF4F8AF71}" type="datetimeFigureOut">
               <a:rPr lang="en-US" smtClean="0"/>
-              <a:t>02-Jun-22</a:t>
+              <a:t>09-Jun-22</a:t>
             </a:fld>
             <a:endParaRPr lang="en-US"/>
           </a:p>
@@ -2388,7 +2388,7 @@
           <a:p>
             <a:fld id="{2A14C9FE-EBC3-45D3-899C-58AAF4F8AF71}" type="datetimeFigureOut">
               <a:rPr lang="en-US" smtClean="0"/>
-              <a:t>02-Jun-22</a:t>
+              <a:t>09-Jun-22</a:t>
             </a:fld>
             <a:endParaRPr lang="en-US"/>
           </a:p>
@@ -2676,7 +2676,7 @@
           <a:p>
             <a:fld id="{2A14C9FE-EBC3-45D3-899C-58AAF4F8AF71}" type="datetimeFigureOut">
               <a:rPr lang="en-US" smtClean="0"/>
-              <a:t>02-Jun-22</a:t>
+              <a:t>09-Jun-22</a:t>
             </a:fld>
             <a:endParaRPr lang="en-US"/>
           </a:p>
@@ -2917,7 +2917,7 @@
           <a:p>
             <a:fld id="{2A14C9FE-EBC3-45D3-899C-58AAF4F8AF71}" type="datetimeFigureOut">
               <a:rPr lang="en-US" smtClean="0"/>
-              <a:t>02-Jun-22</a:t>
+              <a:t>09-Jun-22</a:t>
             </a:fld>
             <a:endParaRPr lang="en-US"/>
           </a:p>
@@ -4003,6 +4003,32 @@
               </a:rPr>
               <a:t>ABP v5.3.0</a:t>
             </a:r>
+            <a:br>
+              <a:rPr lang="en-US" sz="4000" b="1" dirty="0">
+                <a:solidFill>
+                  <a:srgbClr val="292D33"/>
+                </a:solidFill>
+                <a:latin typeface="Euclid Circular B" panose="020B0504000000000000" pitchFamily="34" charset="0"/>
+                <a:ea typeface="Euclid Circular B" panose="020B0504000000000000" pitchFamily="34" charset="0"/>
+              </a:rPr>
+            </a:br>
+            <a:r>
+              <a:rPr lang="en-US" sz="1800" b="1" dirty="0">
+                <a:solidFill>
+                  <a:srgbClr val="292D33"/>
+                </a:solidFill>
+                <a:latin typeface="Euclid Circular B" panose="020B0504000000000000" pitchFamily="34" charset="0"/>
+                <a:ea typeface="Euclid Circular B" panose="020B0504000000000000" pitchFamily="34" charset="0"/>
+              </a:rPr>
+              <a:t>June 14, 2022</a:t>
+            </a:r>
+            <a:endParaRPr lang="en-US" sz="4000" b="1" dirty="0">
+              <a:solidFill>
+                <a:srgbClr val="292D33"/>
+              </a:solidFill>
+              <a:latin typeface="Euclid Circular B" panose="020B0504000000000000" pitchFamily="34" charset="0"/>
+              <a:ea typeface="Euclid Circular B" panose="020B0504000000000000" pitchFamily="34" charset="0"/>
+            </a:endParaRPr>
           </a:p>
         </p:txBody>
       </p:sp>
@@ -4034,7 +4060,7 @@
                 <a:latin typeface="Euclid Circular B" panose="020B0504000000000000" pitchFamily="34" charset="0"/>
                 <a:ea typeface="Euclid Circular B" panose="020B0504000000000000" pitchFamily="34" charset="0"/>
               </a:rPr>
-              <a:t>what’s new with this version</a:t>
+              <a:t>What’s new with this version?</a:t>
             </a:r>
           </a:p>
         </p:txBody>
@@ -5173,7 +5199,7 @@
                 <a:latin typeface="Euclid Circular B" panose="020B0504000000000000" pitchFamily="34" charset="0"/>
                 <a:ea typeface="Euclid Circular B" panose="020B0504000000000000" pitchFamily="34" charset="0"/>
               </a:rPr>
-              <a:t>(2022-06-28)</a:t>
+              <a:t>(July, 2022)</a:t>
             </a:r>
           </a:p>
           <a:p>
@@ -5227,7 +5253,7 @@
                 <a:latin typeface="Euclid Circular B" panose="020B0504000000000000" pitchFamily="34" charset="0"/>
                 <a:ea typeface="Euclid Circular B" panose="020B0504000000000000" pitchFamily="34" charset="0"/>
               </a:rPr>
-              <a:t>(2022-07-26)</a:t>
+              <a:t>(August, 2022)</a:t>
             </a:r>
           </a:p>
           <a:p>
@@ -5250,7 +5276,7 @@
                 <a:latin typeface="Euclid Circular B" panose="020B0504000000000000" pitchFamily="34" charset="0"/>
                 <a:ea typeface="Euclid Circular B" panose="020B0504000000000000" pitchFamily="34" charset="0"/>
               </a:rPr>
-              <a:t>(2022-11-15)</a:t>
+              <a:t>(November, 2022)</a:t>
             </a:r>
             <a:r>
               <a:rPr lang="en-US" dirty="0">
@@ -5290,7 +5316,7 @@
                 <a:latin typeface="Euclid Circular B" panose="020B0504000000000000" pitchFamily="34" charset="0"/>
                 <a:ea typeface="Euclid Circular B" panose="020B0504000000000000" pitchFamily="34" charset="0"/>
               </a:rPr>
-              <a:t>(2022-12-13)</a:t>
+              <a:t>(December, 2022)</a:t>
             </a:r>
           </a:p>
           <a:p>
@@ -7129,6 +7155,483 @@
   <p:clrMapOvr>
     <a:masterClrMapping/>
   </p:clrMapOvr>
+  <p:timing>
+    <p:tnLst>
+      <p:par>
+        <p:cTn id="1" dur="indefinite" restart="never" nodeType="tmRoot">
+          <p:childTnLst>
+            <p:seq concurrent="1" nextAc="seek">
+              <p:cTn id="2" dur="indefinite" nodeType="mainSeq">
+                <p:childTnLst>
+                  <p:par>
+                    <p:cTn id="3" fill="hold">
+                      <p:stCondLst>
+                        <p:cond delay="indefinite"/>
+                      </p:stCondLst>
+                      <p:childTnLst>
+                        <p:par>
+                          <p:cTn id="4" fill="hold">
+                            <p:stCondLst>
+                              <p:cond delay="0"/>
+                            </p:stCondLst>
+                            <p:childTnLst>
+                              <p:par>
+                                <p:cTn id="5" presetID="10" presetClass="entr" presetSubtype="0" fill="hold" nodeType="clickEffect">
+                                  <p:stCondLst>
+                                    <p:cond delay="0"/>
+                                  </p:stCondLst>
+                                  <p:childTnLst>
+                                    <p:set>
+                                      <p:cBhvr>
+                                        <p:cTn id="6" dur="1" fill="hold">
+                                          <p:stCondLst>
+                                            <p:cond delay="0"/>
+                                          </p:stCondLst>
+                                        </p:cTn>
+                                        <p:tgtEl>
+                                          <p:spTgt spid="3074"/>
+                                        </p:tgtEl>
+                                        <p:attrNameLst>
+                                          <p:attrName>style.visibility</p:attrName>
+                                        </p:attrNameLst>
+                                      </p:cBhvr>
+                                      <p:to>
+                                        <p:strVal val="visible"/>
+                                      </p:to>
+                                    </p:set>
+                                    <p:animEffect transition="in" filter="fade">
+                                      <p:cBhvr>
+                                        <p:cTn id="7" dur="500"/>
+                                        <p:tgtEl>
+                                          <p:spTgt spid="3074"/>
+                                        </p:tgtEl>
+                                      </p:cBhvr>
+                                    </p:animEffect>
+                                  </p:childTnLst>
+                                </p:cTn>
+                              </p:par>
+                              <p:par>
+                                <p:cTn id="8" presetID="10" presetClass="entr" presetSubtype="0" fill="hold" grpId="0" nodeType="withEffect">
+                                  <p:stCondLst>
+                                    <p:cond delay="0"/>
+                                  </p:stCondLst>
+                                  <p:childTnLst>
+                                    <p:set>
+                                      <p:cBhvr>
+                                        <p:cTn id="9" dur="1" fill="hold">
+                                          <p:stCondLst>
+                                            <p:cond delay="0"/>
+                                          </p:stCondLst>
+                                        </p:cTn>
+                                        <p:tgtEl>
+                                          <p:spTgt spid="8"/>
+                                        </p:tgtEl>
+                                        <p:attrNameLst>
+                                          <p:attrName>style.visibility</p:attrName>
+                                        </p:attrNameLst>
+                                      </p:cBhvr>
+                                      <p:to>
+                                        <p:strVal val="visible"/>
+                                      </p:to>
+                                    </p:set>
+                                    <p:animEffect transition="in" filter="fade">
+                                      <p:cBhvr>
+                                        <p:cTn id="10" dur="500"/>
+                                        <p:tgtEl>
+                                          <p:spTgt spid="8"/>
+                                        </p:tgtEl>
+                                      </p:cBhvr>
+                                    </p:animEffect>
+                                  </p:childTnLst>
+                                </p:cTn>
+                              </p:par>
+                            </p:childTnLst>
+                          </p:cTn>
+                        </p:par>
+                      </p:childTnLst>
+                    </p:cTn>
+                  </p:par>
+                  <p:par>
+                    <p:cTn id="11" fill="hold">
+                      <p:stCondLst>
+                        <p:cond delay="indefinite"/>
+                      </p:stCondLst>
+                      <p:childTnLst>
+                        <p:par>
+                          <p:cTn id="12" fill="hold">
+                            <p:stCondLst>
+                              <p:cond delay="0"/>
+                            </p:stCondLst>
+                            <p:childTnLst>
+                              <p:par>
+                                <p:cTn id="13" presetID="10" presetClass="entr" presetSubtype="0" fill="hold" nodeType="clickEffect">
+                                  <p:stCondLst>
+                                    <p:cond delay="0"/>
+                                  </p:stCondLst>
+                                  <p:childTnLst>
+                                    <p:set>
+                                      <p:cBhvr>
+                                        <p:cTn id="14" dur="1" fill="hold">
+                                          <p:stCondLst>
+                                            <p:cond delay="0"/>
+                                          </p:stCondLst>
+                                        </p:cTn>
+                                        <p:tgtEl>
+                                          <p:spTgt spid="3076"/>
+                                        </p:tgtEl>
+                                        <p:attrNameLst>
+                                          <p:attrName>style.visibility</p:attrName>
+                                        </p:attrNameLst>
+                                      </p:cBhvr>
+                                      <p:to>
+                                        <p:strVal val="visible"/>
+                                      </p:to>
+                                    </p:set>
+                                    <p:animEffect transition="in" filter="fade">
+                                      <p:cBhvr>
+                                        <p:cTn id="15" dur="500"/>
+                                        <p:tgtEl>
+                                          <p:spTgt spid="3076"/>
+                                        </p:tgtEl>
+                                      </p:cBhvr>
+                                    </p:animEffect>
+                                  </p:childTnLst>
+                                </p:cTn>
+                              </p:par>
+                              <p:par>
+                                <p:cTn id="16" presetID="10" presetClass="entr" presetSubtype="0" fill="hold" grpId="0" nodeType="withEffect">
+                                  <p:stCondLst>
+                                    <p:cond delay="0"/>
+                                  </p:stCondLst>
+                                  <p:childTnLst>
+                                    <p:set>
+                                      <p:cBhvr>
+                                        <p:cTn id="17" dur="1" fill="hold">
+                                          <p:stCondLst>
+                                            <p:cond delay="0"/>
+                                          </p:stCondLst>
+                                        </p:cTn>
+                                        <p:tgtEl>
+                                          <p:spTgt spid="10"/>
+                                        </p:tgtEl>
+                                        <p:attrNameLst>
+                                          <p:attrName>style.visibility</p:attrName>
+                                        </p:attrNameLst>
+                                      </p:cBhvr>
+                                      <p:to>
+                                        <p:strVal val="visible"/>
+                                      </p:to>
+                                    </p:set>
+                                    <p:animEffect transition="in" filter="fade">
+                                      <p:cBhvr>
+                                        <p:cTn id="18" dur="500"/>
+                                        <p:tgtEl>
+                                          <p:spTgt spid="10"/>
+                                        </p:tgtEl>
+                                      </p:cBhvr>
+                                    </p:animEffect>
+                                  </p:childTnLst>
+                                </p:cTn>
+                              </p:par>
+                            </p:childTnLst>
+                          </p:cTn>
+                        </p:par>
+                      </p:childTnLst>
+                    </p:cTn>
+                  </p:par>
+                  <p:par>
+                    <p:cTn id="19" fill="hold">
+                      <p:stCondLst>
+                        <p:cond delay="indefinite"/>
+                      </p:stCondLst>
+                      <p:childTnLst>
+                        <p:par>
+                          <p:cTn id="20" fill="hold">
+                            <p:stCondLst>
+                              <p:cond delay="0"/>
+                            </p:stCondLst>
+                            <p:childTnLst>
+                              <p:par>
+                                <p:cTn id="21" presetID="10" presetClass="entr" presetSubtype="0" fill="hold" grpId="0" nodeType="clickEffect">
+                                  <p:stCondLst>
+                                    <p:cond delay="0"/>
+                                  </p:stCondLst>
+                                  <p:childTnLst>
+                                    <p:set>
+                                      <p:cBhvr>
+                                        <p:cTn id="22" dur="1" fill="hold">
+                                          <p:stCondLst>
+                                            <p:cond delay="0"/>
+                                          </p:stCondLst>
+                                        </p:cTn>
+                                        <p:tgtEl>
+                                          <p:spTgt spid="12"/>
+                                        </p:tgtEl>
+                                        <p:attrNameLst>
+                                          <p:attrName>style.visibility</p:attrName>
+                                        </p:attrNameLst>
+                                      </p:cBhvr>
+                                      <p:to>
+                                        <p:strVal val="visible"/>
+                                      </p:to>
+                                    </p:set>
+                                    <p:animEffect transition="in" filter="fade">
+                                      <p:cBhvr>
+                                        <p:cTn id="23" dur="500"/>
+                                        <p:tgtEl>
+                                          <p:spTgt spid="12"/>
+                                        </p:tgtEl>
+                                      </p:cBhvr>
+                                    </p:animEffect>
+                                  </p:childTnLst>
+                                </p:cTn>
+                              </p:par>
+                              <p:par>
+                                <p:cTn id="24" presetID="10" presetClass="entr" presetSubtype="0" fill="hold" nodeType="withEffect">
+                                  <p:stCondLst>
+                                    <p:cond delay="0"/>
+                                  </p:stCondLst>
+                                  <p:childTnLst>
+                                    <p:set>
+                                      <p:cBhvr>
+                                        <p:cTn id="25" dur="1" fill="hold">
+                                          <p:stCondLst>
+                                            <p:cond delay="0"/>
+                                          </p:stCondLst>
+                                        </p:cTn>
+                                        <p:tgtEl>
+                                          <p:spTgt spid="3078"/>
+                                        </p:tgtEl>
+                                        <p:attrNameLst>
+                                          <p:attrName>style.visibility</p:attrName>
+                                        </p:attrNameLst>
+                                      </p:cBhvr>
+                                      <p:to>
+                                        <p:strVal val="visible"/>
+                                      </p:to>
+                                    </p:set>
+                                    <p:animEffect transition="in" filter="fade">
+                                      <p:cBhvr>
+                                        <p:cTn id="26" dur="500"/>
+                                        <p:tgtEl>
+                                          <p:spTgt spid="3078"/>
+                                        </p:tgtEl>
+                                      </p:cBhvr>
+                                    </p:animEffect>
+                                  </p:childTnLst>
+                                </p:cTn>
+                              </p:par>
+                            </p:childTnLst>
+                          </p:cTn>
+                        </p:par>
+                      </p:childTnLst>
+                    </p:cTn>
+                  </p:par>
+                  <p:par>
+                    <p:cTn id="27" fill="hold">
+                      <p:stCondLst>
+                        <p:cond delay="indefinite"/>
+                      </p:stCondLst>
+                      <p:childTnLst>
+                        <p:par>
+                          <p:cTn id="28" fill="hold">
+                            <p:stCondLst>
+                              <p:cond delay="0"/>
+                            </p:stCondLst>
+                            <p:childTnLst>
+                              <p:par>
+                                <p:cTn id="29" presetID="10" presetClass="entr" presetSubtype="0" fill="hold" grpId="0" nodeType="clickEffect">
+                                  <p:stCondLst>
+                                    <p:cond delay="0"/>
+                                  </p:stCondLst>
+                                  <p:childTnLst>
+                                    <p:set>
+                                      <p:cBhvr>
+                                        <p:cTn id="30" dur="1" fill="hold">
+                                          <p:stCondLst>
+                                            <p:cond delay="0"/>
+                                          </p:stCondLst>
+                                        </p:cTn>
+                                        <p:tgtEl>
+                                          <p:spTgt spid="14"/>
+                                        </p:tgtEl>
+                                        <p:attrNameLst>
+                                          <p:attrName>style.visibility</p:attrName>
+                                        </p:attrNameLst>
+                                      </p:cBhvr>
+                                      <p:to>
+                                        <p:strVal val="visible"/>
+                                      </p:to>
+                                    </p:set>
+                                    <p:animEffect transition="in" filter="fade">
+                                      <p:cBhvr>
+                                        <p:cTn id="31" dur="500"/>
+                                        <p:tgtEl>
+                                          <p:spTgt spid="14"/>
+                                        </p:tgtEl>
+                                      </p:cBhvr>
+                                    </p:animEffect>
+                                  </p:childTnLst>
+                                </p:cTn>
+                              </p:par>
+                              <p:par>
+                                <p:cTn id="32" presetID="10" presetClass="entr" presetSubtype="0" fill="hold" nodeType="withEffect">
+                                  <p:stCondLst>
+                                    <p:cond delay="0"/>
+                                  </p:stCondLst>
+                                  <p:childTnLst>
+                                    <p:set>
+                                      <p:cBhvr>
+                                        <p:cTn id="33" dur="1" fill="hold">
+                                          <p:stCondLst>
+                                            <p:cond delay="0"/>
+                                          </p:stCondLst>
+                                        </p:cTn>
+                                        <p:tgtEl>
+                                          <p:spTgt spid="3080"/>
+                                        </p:tgtEl>
+                                        <p:attrNameLst>
+                                          <p:attrName>style.visibility</p:attrName>
+                                        </p:attrNameLst>
+                                      </p:cBhvr>
+                                      <p:to>
+                                        <p:strVal val="visible"/>
+                                      </p:to>
+                                    </p:set>
+                                    <p:animEffect transition="in" filter="fade">
+                                      <p:cBhvr>
+                                        <p:cTn id="34" dur="500"/>
+                                        <p:tgtEl>
+                                          <p:spTgt spid="3080"/>
+                                        </p:tgtEl>
+                                      </p:cBhvr>
+                                    </p:animEffect>
+                                  </p:childTnLst>
+                                </p:cTn>
+                              </p:par>
+                            </p:childTnLst>
+                          </p:cTn>
+                        </p:par>
+                      </p:childTnLst>
+                    </p:cTn>
+                  </p:par>
+                  <p:par>
+                    <p:cTn id="35" fill="hold">
+                      <p:stCondLst>
+                        <p:cond delay="indefinite"/>
+                      </p:stCondLst>
+                      <p:childTnLst>
+                        <p:par>
+                          <p:cTn id="36" fill="hold">
+                            <p:stCondLst>
+                              <p:cond delay="0"/>
+                            </p:stCondLst>
+                            <p:childTnLst>
+                              <p:par>
+                                <p:cTn id="37" presetID="10" presetClass="entr" presetSubtype="0" fill="hold" grpId="0" nodeType="clickEffect">
+                                  <p:stCondLst>
+                                    <p:cond delay="0"/>
+                                  </p:stCondLst>
+                                  <p:childTnLst>
+                                    <p:set>
+                                      <p:cBhvr>
+                                        <p:cTn id="38" dur="1" fill="hold">
+                                          <p:stCondLst>
+                                            <p:cond delay="0"/>
+                                          </p:stCondLst>
+                                        </p:cTn>
+                                        <p:tgtEl>
+                                          <p:spTgt spid="18"/>
+                                        </p:tgtEl>
+                                        <p:attrNameLst>
+                                          <p:attrName>style.visibility</p:attrName>
+                                        </p:attrNameLst>
+                                      </p:cBhvr>
+                                      <p:to>
+                                        <p:strVal val="visible"/>
+                                      </p:to>
+                                    </p:set>
+                                    <p:animEffect transition="in" filter="fade">
+                                      <p:cBhvr>
+                                        <p:cTn id="39" dur="500"/>
+                                        <p:tgtEl>
+                                          <p:spTgt spid="18"/>
+                                        </p:tgtEl>
+                                      </p:cBhvr>
+                                    </p:animEffect>
+                                  </p:childTnLst>
+                                </p:cTn>
+                              </p:par>
+                              <p:par>
+                                <p:cTn id="40" presetID="10" presetClass="entr" presetSubtype="0" fill="hold" nodeType="withEffect">
+                                  <p:stCondLst>
+                                    <p:cond delay="0"/>
+                                  </p:stCondLst>
+                                  <p:childTnLst>
+                                    <p:set>
+                                      <p:cBhvr>
+                                        <p:cTn id="41" dur="1" fill="hold">
+                                          <p:stCondLst>
+                                            <p:cond delay="0"/>
+                                          </p:stCondLst>
+                                        </p:cTn>
+                                        <p:tgtEl>
+                                          <p:spTgt spid="3084"/>
+                                        </p:tgtEl>
+                                        <p:attrNameLst>
+                                          <p:attrName>style.visibility</p:attrName>
+                                        </p:attrNameLst>
+                                      </p:cBhvr>
+                                      <p:to>
+                                        <p:strVal val="visible"/>
+                                      </p:to>
+                                    </p:set>
+                                    <p:animEffect transition="in" filter="fade">
+                                      <p:cBhvr>
+                                        <p:cTn id="42" dur="500"/>
+                                        <p:tgtEl>
+                                          <p:spTgt spid="3084"/>
+                                        </p:tgtEl>
+                                      </p:cBhvr>
+                                    </p:animEffect>
+                                  </p:childTnLst>
+                                </p:cTn>
+                              </p:par>
+                            </p:childTnLst>
+                          </p:cTn>
+                        </p:par>
+                      </p:childTnLst>
+                    </p:cTn>
+                  </p:par>
+                </p:childTnLst>
+              </p:cTn>
+              <p:prevCondLst>
+                <p:cond evt="onPrev" delay="0">
+                  <p:tgtEl>
+                    <p:sldTgt/>
+                  </p:tgtEl>
+                </p:cond>
+              </p:prevCondLst>
+              <p:nextCondLst>
+                <p:cond evt="onNext" delay="0">
+                  <p:tgtEl>
+                    <p:sldTgt/>
+                  </p:tgtEl>
+                </p:cond>
+              </p:nextCondLst>
+            </p:seq>
+          </p:childTnLst>
+        </p:cTn>
+      </p:par>
+    </p:tnLst>
+    <p:bldLst>
+      <p:bldP spid="8" grpId="0"/>
+      <p:bldP spid="10" grpId="0"/>
+      <p:bldP spid="12" grpId="0"/>
+      <p:bldP spid="14" grpId="0"/>
+      <p:bldP spid="18" grpId="0"/>
+    </p:bldLst>
+  </p:timing>
 </p:sld>
 </file>
 

</xml_diff>